<commit_message>
mengedit bagian results data event dan profile
</commit_message>
<xml_diff>
--- a/Intermediate backend.pptx
+++ b/Intermediate backend.pptx
@@ -922,12 +922,10 @@
         <a:lstStyle/>
         <a:p>
           <a:r>
-            <a:rPr lang="en-US"/>
-            <a:t>Authentication and A</a:t>
-          </a:r>
-          <a:r>
-            <a:rPr lang="en-ID"/>
-            <a:t>uthorization</a:t>
+            <a:rPr lang="en-ID">
+              <a:latin typeface="Audiowide" panose="020B0604020202020204" charset="0"/>
+            </a:rPr>
+            <a:t>Document Object Model</a:t>
           </a:r>
           <a:endParaRPr lang="en-US"/>
         </a:p>
@@ -1270,12 +1268,12 @@
         </a:fontRef>
       </dsp:style>
       <dsp:txBody>
-        <a:bodyPr spcFirstLastPara="0" vert="horz" wrap="square" lIns="137160" tIns="137160" rIns="137160" bIns="137160" numCol="1" spcCol="1270" anchor="ctr" anchorCtr="0">
+        <a:bodyPr spcFirstLastPara="0" vert="horz" wrap="square" lIns="156210" tIns="156210" rIns="156210" bIns="156210" numCol="1" spcCol="1270" anchor="ctr" anchorCtr="0">
           <a:noAutofit/>
         </a:bodyPr>
         <a:lstStyle/>
         <a:p>
-          <a:pPr marL="0" lvl="0" indent="0" algn="l" defTabSz="1600200">
+          <a:pPr marL="0" lvl="0" indent="0" algn="l" defTabSz="1822450">
             <a:lnSpc>
               <a:spcPct val="90000"/>
             </a:lnSpc>
@@ -1288,14 +1286,12 @@
             <a:buNone/>
           </a:pPr>
           <a:r>
-            <a:rPr lang="en-US" sz="3600" kern="1200"/>
-            <a:t>Authentication and A</a:t>
+            <a:rPr lang="en-ID" sz="4100" kern="1200">
+              <a:latin typeface="Audiowide" panose="020B0604020202020204" charset="0"/>
+            </a:rPr>
+            <a:t>Document Object Model</a:t>
           </a:r>
-          <a:r>
-            <a:rPr lang="en-ID" sz="3600" kern="1200"/>
-            <a:t>uthorization</a:t>
-          </a:r>
-          <a:endParaRPr lang="en-US" sz="3600" kern="1200"/>
+          <a:endParaRPr lang="en-US" sz="4100" kern="1200"/>
         </a:p>
       </dsp:txBody>
       <dsp:txXfrm>
@@ -1355,12 +1351,12 @@
         </a:fontRef>
       </dsp:style>
       <dsp:txBody>
-        <a:bodyPr spcFirstLastPara="0" vert="horz" wrap="square" lIns="137160" tIns="137160" rIns="137160" bIns="137160" numCol="1" spcCol="1270" anchor="ctr" anchorCtr="0">
+        <a:bodyPr spcFirstLastPara="0" vert="horz" wrap="square" lIns="156210" tIns="156210" rIns="156210" bIns="156210" numCol="1" spcCol="1270" anchor="ctr" anchorCtr="0">
           <a:noAutofit/>
         </a:bodyPr>
         <a:lstStyle/>
         <a:p>
-          <a:pPr marL="0" lvl="0" indent="0" algn="l" defTabSz="1600200">
+          <a:pPr marL="0" lvl="0" indent="0" algn="l" defTabSz="1822450">
             <a:lnSpc>
               <a:spcPct val="90000"/>
             </a:lnSpc>
@@ -1373,7 +1369,7 @@
             <a:buNone/>
           </a:pPr>
           <a:r>
-            <a:rPr lang="en-US" sz="3600" kern="1200"/>
+            <a:rPr lang="en-US" sz="4100" kern="1200"/>
             <a:t>JWT</a:t>
           </a:r>
         </a:p>
@@ -1435,12 +1431,12 @@
         </a:fontRef>
       </dsp:style>
       <dsp:txBody>
-        <a:bodyPr spcFirstLastPara="0" vert="horz" wrap="square" lIns="137160" tIns="137160" rIns="137160" bIns="137160" numCol="1" spcCol="1270" anchor="ctr" anchorCtr="0">
+        <a:bodyPr spcFirstLastPara="0" vert="horz" wrap="square" lIns="156210" tIns="156210" rIns="156210" bIns="156210" numCol="1" spcCol="1270" anchor="ctr" anchorCtr="0">
           <a:noAutofit/>
         </a:bodyPr>
         <a:lstStyle/>
         <a:p>
-          <a:pPr marL="0" lvl="0" indent="0" algn="l" defTabSz="1600200">
+          <a:pPr marL="0" lvl="0" indent="0" algn="l" defTabSz="1822450">
             <a:lnSpc>
               <a:spcPct val="90000"/>
             </a:lnSpc>
@@ -1453,10 +1449,10 @@
             <a:buNone/>
           </a:pPr>
           <a:r>
-            <a:rPr lang="en-ID" sz="3600" b="0" i="0" u="none" kern="1200"/>
+            <a:rPr lang="en-ID" sz="4100" b="0" i="0" u="none" kern="1200"/>
             <a:t>CORS</a:t>
           </a:r>
-          <a:endParaRPr lang="en-US" sz="3600" kern="1200"/>
+          <a:endParaRPr lang="en-US" sz="4100" kern="1200"/>
         </a:p>
       </dsp:txBody>
       <dsp:txXfrm>
@@ -1516,12 +1512,12 @@
         </a:fontRef>
       </dsp:style>
       <dsp:txBody>
-        <a:bodyPr spcFirstLastPara="0" vert="horz" wrap="square" lIns="137160" tIns="137160" rIns="137160" bIns="137160" numCol="1" spcCol="1270" anchor="ctr" anchorCtr="0">
+        <a:bodyPr spcFirstLastPara="0" vert="horz" wrap="square" lIns="156210" tIns="156210" rIns="156210" bIns="156210" numCol="1" spcCol="1270" anchor="ctr" anchorCtr="0">
           <a:noAutofit/>
         </a:bodyPr>
         <a:lstStyle/>
         <a:p>
-          <a:pPr marL="0" lvl="0" indent="0" algn="l" defTabSz="1600200">
+          <a:pPr marL="0" lvl="0" indent="0" algn="l" defTabSz="1822450">
             <a:lnSpc>
               <a:spcPct val="90000"/>
             </a:lnSpc>
@@ -1534,10 +1530,10 @@
             <a:buNone/>
           </a:pPr>
           <a:r>
-            <a:rPr lang="en-ID" sz="3600" b="0" i="0" u="none" kern="1200"/>
+            <a:rPr lang="en-ID" sz="4100" b="0" i="0" u="none" kern="1200"/>
             <a:t>MongoDB</a:t>
           </a:r>
-          <a:endParaRPr lang="en-US" sz="3600" kern="1200"/>
+          <a:endParaRPr lang="en-US" sz="4100" kern="1200"/>
         </a:p>
       </dsp:txBody>
       <dsp:txXfrm>
@@ -4196,7 +4192,7 @@
           <a:p>
             <a:fld id="{82EDB8D0-98ED-4B86-9D5F-E61ADC70144D}" type="datetimeFigureOut">
               <a:rPr lang="en-US" smtClean="0"/>
-              <a:t>4/17/2023</a:t>
+              <a:t>5/15/2023</a:t>
             </a:fld>
             <a:endParaRPr lang="en-US" dirty="0"/>
           </a:p>
@@ -4611,7 +4607,7 @@
           <a:p>
             <a:fld id="{82EDB8D0-98ED-4B86-9D5F-E61ADC70144D}" type="datetimeFigureOut">
               <a:rPr lang="en-US" smtClean="0"/>
-              <a:t>4/17/2023</a:t>
+              <a:t>5/15/2023</a:t>
             </a:fld>
             <a:endParaRPr lang="en-US"/>
           </a:p>
@@ -5103,7 +5099,7 @@
           <a:p>
             <a:fld id="{82EDB8D0-98ED-4B86-9D5F-E61ADC70144D}" type="datetimeFigureOut">
               <a:rPr lang="en-US" smtClean="0"/>
-              <a:t>4/17/2023</a:t>
+              <a:t>5/15/2023</a:t>
             </a:fld>
             <a:endParaRPr lang="en-US"/>
           </a:p>
@@ -5590,7 +5586,7 @@
           <a:p>
             <a:fld id="{82EDB8D0-98ED-4B86-9D5F-E61ADC70144D}" type="datetimeFigureOut">
               <a:rPr lang="en-US" smtClean="0"/>
-              <a:t>4/17/2023</a:t>
+              <a:t>5/15/2023</a:t>
             </a:fld>
             <a:endParaRPr lang="en-US" dirty="0"/>
           </a:p>
@@ -6359,7 +6355,7 @@
           <a:p>
             <a:fld id="{82EDB8D0-98ED-4B86-9D5F-E61ADC70144D}" type="datetimeFigureOut">
               <a:rPr lang="en-US" smtClean="0"/>
-              <a:t>4/17/2023</a:t>
+              <a:t>5/15/2023</a:t>
             </a:fld>
             <a:endParaRPr lang="en-US"/>
           </a:p>
@@ -6841,7 +6837,7 @@
           <a:p>
             <a:fld id="{82EDB8D0-98ED-4B86-9D5F-E61ADC70144D}" type="datetimeFigureOut">
               <a:rPr lang="en-US" smtClean="0"/>
-              <a:t>4/17/2023</a:t>
+              <a:t>5/15/2023</a:t>
             </a:fld>
             <a:endParaRPr lang="en-US"/>
           </a:p>
@@ -7537,7 +7533,7 @@
           <a:p>
             <a:fld id="{82EDB8D0-98ED-4B86-9D5F-E61ADC70144D}" type="datetimeFigureOut">
               <a:rPr lang="en-US" smtClean="0"/>
-              <a:t>4/17/2023</a:t>
+              <a:t>5/15/2023</a:t>
             </a:fld>
             <a:endParaRPr lang="en-US"/>
           </a:p>
@@ -7962,7 +7958,7 @@
           <a:p>
             <a:fld id="{82EDB8D0-98ED-4B86-9D5F-E61ADC70144D}" type="datetimeFigureOut">
               <a:rPr lang="en-US" smtClean="0"/>
-              <a:t>4/17/2023</a:t>
+              <a:t>5/15/2023</a:t>
             </a:fld>
             <a:endParaRPr lang="en-US"/>
           </a:p>
@@ -8359,7 +8355,7 @@
           <a:p>
             <a:fld id="{82EDB8D0-98ED-4B86-9D5F-E61ADC70144D}" type="datetimeFigureOut">
               <a:rPr lang="en-US" smtClean="0"/>
-              <a:t>4/17/2023</a:t>
+              <a:t>5/15/2023</a:t>
             </a:fld>
             <a:endParaRPr lang="en-US"/>
           </a:p>
@@ -8954,7 +8950,7 @@
           <a:p>
             <a:fld id="{82EDB8D0-98ED-4B86-9D5F-E61ADC70144D}" type="datetimeFigureOut">
               <a:rPr lang="en-US" smtClean="0"/>
-              <a:t>4/17/2023</a:t>
+              <a:t>5/15/2023</a:t>
             </a:fld>
             <a:endParaRPr lang="en-US"/>
           </a:p>
@@ -9529,7 +9525,7 @@
           <a:p>
             <a:fld id="{82EDB8D0-98ED-4B86-9D5F-E61ADC70144D}" type="datetimeFigureOut">
               <a:rPr lang="en-US" smtClean="0"/>
-              <a:t>4/17/2023</a:t>
+              <a:t>5/15/2023</a:t>
             </a:fld>
             <a:endParaRPr lang="en-US"/>
           </a:p>
@@ -10056,7 +10052,7 @@
             <a:fld id="{82EDB8D0-98ED-4B86-9D5F-E61ADC70144D}" type="datetimeFigureOut">
               <a:rPr lang="en-US" smtClean="0"/>
               <a:pPr/>
-              <a:t>4/17/2023</a:t>
+              <a:t>5/15/2023</a:t>
             </a:fld>
             <a:endParaRPr lang="en-US" dirty="0"/>
           </a:p>
@@ -10606,7 +10602,7 @@
               <a:rPr lang="en-US">
                 <a:latin typeface="Arial Nova" panose="020B0604020202020204" pitchFamily="34" charset="0"/>
               </a:rPr>
-              <a:t>Backend Development</a:t>
+              <a:t>Frontend Development</a:t>
             </a:r>
             <a:endParaRPr lang="en-ID">
               <a:latin typeface="Arial Nova" panose="020B0604020202020204" pitchFamily="34" charset="0"/>
@@ -12333,7 +12329,7 @@
             <p:ph idx="1"/>
             <p:extLst>
               <p:ext uri="{D42A27DB-BD31-4B8C-83A1-F6EECF244321}">
-                <p14:modId xmlns:p14="http://schemas.microsoft.com/office/powerpoint/2010/main" val="3194301671"/>
+                <p14:modId xmlns:p14="http://schemas.microsoft.com/office/powerpoint/2010/main" val="3907392044"/>
               </p:ext>
             </p:extLst>
           </p:nvPr>

</xml_diff>